<commit_message>
Remove reference to the release name
</commit_message>
<xml_diff>
--- a/Units_development/IBM Cloud Private Security_RS.pptx
+++ b/Units_development/IBM Cloud Private Security_RS.pptx
@@ -250,7 +250,7 @@
           <a:p>
             <a:fld id="{26BE012A-D992-5D42-B86E-AA2BC0764EE1}" type="datetimeFigureOut">
               <a:rPr lang="en-US" smtClean="0"/>
-              <a:t>6/4/18</a:t>
+              <a:t>6/5/18</a:t>
             </a:fld>
             <a:endParaRPr lang="en-US"/>
           </a:p>
@@ -1702,7 +1702,7 @@
           <a:ln/>
           <a:extLst>
             <a:ext uri="{91240B29-F687-4f45-9708-019B960494DF}">
-              <a14:hiddenLine xmlns="" xmlns:a14="http://schemas.microsoft.com/office/drawing/2010/main" w="9525" cap="rnd">
+              <a14:hiddenLine xmlns:a14="http://schemas.microsoft.com/office/drawing/2010/main" xmlns="" w="9525" cap="rnd">
                 <a:solidFill>
                   <a:srgbClr val="000000"/>
                 </a:solidFill>
@@ -1752,14 +1752,14 @@
           </a:ln>
           <a:extLst>
             <a:ext uri="{909E8E84-426E-40dd-AFC4-6F175D3DCCD1}">
-              <a14:hiddenFill xmlns="" xmlns:a14="http://schemas.microsoft.com/office/drawing/2010/main">
+              <a14:hiddenFill xmlns:a14="http://schemas.microsoft.com/office/drawing/2010/main" xmlns="">
                 <a:solidFill>
                   <a:srgbClr val="FFFFFF"/>
                 </a:solidFill>
               </a14:hiddenFill>
             </a:ext>
             <a:ext uri="{91240B29-F687-4f45-9708-019B960494DF}">
-              <a14:hiddenLine xmlns="" xmlns:a14="http://schemas.microsoft.com/office/drawing/2010/main" w="21600">
+              <a14:hiddenLine xmlns:a14="http://schemas.microsoft.com/office/drawing/2010/main" xmlns="" w="21600">
                 <a:solidFill>
                   <a:srgbClr val="000000"/>
                 </a:solidFill>
@@ -38295,7 +38295,7 @@
                   <a:schemeClr val="bg2"/>
                 </a:solidFill>
               </a:rPr>
-              <a:t>What’s New in IBM Cloud Private 2.1.0.3</a:t>
+              <a:t>What’s New in IBM Cloud Private</a:t>
             </a:r>
           </a:p>
           <a:p>
@@ -40030,7 +40030,7 @@
                   <a:schemeClr val="bg2"/>
                 </a:solidFill>
               </a:rPr>
-              <a:t>What’s New in IBM Cloud Private 2.1.0.3</a:t>
+              <a:t>What’s New in IBM Cloud Private</a:t>
             </a:r>
           </a:p>
           <a:p>
@@ -40745,7 +40745,7 @@
                   <a:schemeClr val="bg2"/>
                 </a:solidFill>
               </a:rPr>
-              <a:t>What’s New in IBM Cloud Private 2.1.0.3</a:t>
+              <a:t>What’s New in IBM Cloud Private</a:t>
             </a:r>
           </a:p>
           <a:p>
@@ -41073,7 +41073,7 @@
                   <a:schemeClr val="bg2"/>
                 </a:solidFill>
               </a:rPr>
-              <a:t>What’s New in IBM Cloud Private 2.1.0.3</a:t>
+              <a:t>What’s New in IBM Cloud Private</a:t>
             </a:r>
           </a:p>
           <a:p>
@@ -41719,7 +41719,7 @@
                   <a:schemeClr val="bg2"/>
                 </a:solidFill>
               </a:rPr>
-              <a:t>What’s New in IBM Cloud Private 2.1.0.3</a:t>
+              <a:t>What’s New in IBM Cloud Private</a:t>
             </a:r>
           </a:p>
           <a:p>
@@ -43413,7 +43413,7 @@
           <a:noFill/>
           <a:extLst>
             <a:ext uri="{909E8E84-426E-40dd-AFC4-6F175D3DCCD1}">
-              <a14:hiddenFill xmlns="" xmlns:a14="http://schemas.microsoft.com/office/drawing/2010/main">
+              <a14:hiddenFill xmlns:a14="http://schemas.microsoft.com/office/drawing/2010/main" xmlns="">
                 <a:solidFill>
                   <a:srgbClr val="FFFFFF"/>
                 </a:solidFill>
@@ -45803,7 +45803,7 @@
                   <a:schemeClr val="bg2"/>
                 </a:solidFill>
               </a:rPr>
-              <a:t>What’s New in IBM Cloud Private 2.1.0.3</a:t>
+              <a:t>What’s New in IBM Cloud Private</a:t>
             </a:r>
           </a:p>
           <a:p>
@@ -46555,7 +46555,7 @@
                 <a:ea typeface="Helvetica Neue" panose="02000503000000020004" pitchFamily="2" charset="0"/>
                 <a:cs typeface="Helvetica Neue" panose="02000503000000020004" pitchFamily="2" charset="0"/>
               </a:rPr>
-              <a:t>What’s New in IBM Cloud Private 2.1.0.3</a:t>
+              <a:t>What’s New in IBM Cloud Private</a:t>
             </a:r>
           </a:p>
         </p:txBody>
@@ -46855,7 +46855,7 @@
                   <a:schemeClr val="bg2"/>
                 </a:solidFill>
               </a:rPr>
-              <a:t>What’s New in IBM Cloud Private 2.1.0.3</a:t>
+              <a:t>What’s New in IBM Cloud Private</a:t>
             </a:r>
           </a:p>
           <a:p>
@@ -51537,7 +51537,7 @@
                   <a:schemeClr val="bg2"/>
                 </a:solidFill>
               </a:rPr>
-              <a:t>What’s New in IBM Cloud Private 2.1.0.3</a:t>
+              <a:t>What’s New in IBM Cloud Private</a:t>
             </a:r>
           </a:p>
           <a:p>
@@ -52182,7 +52182,7 @@
                   <a:schemeClr val="bg2"/>
                 </a:solidFill>
               </a:rPr>
-              <a:t>What’s New in IBM Cloud Private 2.1.0.3</a:t>
+              <a:t>What’s New in IBM Cloud Private</a:t>
             </a:r>
           </a:p>
           <a:p>

</xml_diff>